<commit_message>
update ppt and code
</commit_message>
<xml_diff>
--- a/Exploratory Data Analysis/Case Study/EDA Case Study -Bank Loan.pptx
+++ b/Exploratory Data Analysis/Case Study/EDA Case Study -Bank Loan.pptx
@@ -5,39 +5,41 @@
     <p:sldMasterId id="2147483659" r:id="rId1"/>
   </p:sldMasterIdLst>
   <p:notesMasterIdLst>
-    <p:notesMasterId r:id="rId17"/>
+    <p:notesMasterId r:id="rId19"/>
   </p:notesMasterIdLst>
   <p:sldIdLst>
     <p:sldId id="256" r:id="rId2"/>
     <p:sldId id="270" r:id="rId3"/>
     <p:sldId id="257" r:id="rId4"/>
     <p:sldId id="271" r:id="rId5"/>
-    <p:sldId id="258" r:id="rId6"/>
-    <p:sldId id="259" r:id="rId7"/>
-    <p:sldId id="260" r:id="rId8"/>
-    <p:sldId id="261" r:id="rId9"/>
-    <p:sldId id="262" r:id="rId10"/>
-    <p:sldId id="263" r:id="rId11"/>
-    <p:sldId id="264" r:id="rId12"/>
-    <p:sldId id="266" r:id="rId13"/>
-    <p:sldId id="267" r:id="rId14"/>
-    <p:sldId id="268" r:id="rId15"/>
-    <p:sldId id="269" r:id="rId16"/>
+    <p:sldId id="272" r:id="rId6"/>
+    <p:sldId id="258" r:id="rId7"/>
+    <p:sldId id="259" r:id="rId8"/>
+    <p:sldId id="262" r:id="rId9"/>
+    <p:sldId id="263" r:id="rId10"/>
+    <p:sldId id="264" r:id="rId11"/>
+    <p:sldId id="273" r:id="rId12"/>
+    <p:sldId id="274" r:id="rId13"/>
+    <p:sldId id="275" r:id="rId14"/>
+    <p:sldId id="266" r:id="rId15"/>
+    <p:sldId id="267" r:id="rId16"/>
+    <p:sldId id="268" r:id="rId17"/>
+    <p:sldId id="269" r:id="rId18"/>
   </p:sldIdLst>
   <p:sldSz cx="9144000" cy="5143500" type="screen16x9"/>
   <p:notesSz cx="6858000" cy="9144000"/>
   <p:embeddedFontLst>
     <p:embeddedFont>
       <p:font typeface="Maven Pro" panose="020B0604020202020204" charset="0"/>
-      <p:regular r:id="rId18"/>
-      <p:bold r:id="rId19"/>
+      <p:regular r:id="rId20"/>
+      <p:bold r:id="rId21"/>
     </p:embeddedFont>
     <p:embeddedFont>
       <p:font typeface="Nunito" panose="020B0604020202020204" charset="0"/>
-      <p:regular r:id="rId20"/>
-      <p:bold r:id="rId21"/>
-      <p:italic r:id="rId22"/>
-      <p:boldItalic r:id="rId23"/>
+      <p:regular r:id="rId22"/>
+      <p:bold r:id="rId23"/>
+      <p:italic r:id="rId24"/>
+      <p:boldItalic r:id="rId25"/>
     </p:embeddedFont>
   </p:embeddedFontLst>
   <p:defaultTextStyle>
@@ -838,214 +840,6 @@
   <p:cSld>
     <p:spTree>
       <p:nvGrpSpPr>
-        <p:cNvPr id="1" name="Shape 345"/>
-        <p:cNvGrpSpPr/>
-        <p:nvPr/>
-      </p:nvGrpSpPr>
-      <p:grpSpPr>
-        <a:xfrm>
-          <a:off x="0" y="0"/>
-          <a:ext cx="0" cy="0"/>
-          <a:chOff x="0" y="0"/>
-          <a:chExt cx="0" cy="0"/>
-        </a:xfrm>
-      </p:grpSpPr>
-      <p:sp>
-        <p:nvSpPr>
-          <p:cNvPr id="346" name="Google Shape;346;g716bd5a473_1_313:notes"/>
-          <p:cNvSpPr>
-            <a:spLocks noGrp="1" noRot="1" noChangeAspect="1"/>
-          </p:cNvSpPr>
-          <p:nvPr>
-            <p:ph type="sldImg" idx="2"/>
-          </p:nvPr>
-        </p:nvSpPr>
-        <p:spPr>
-          <a:xfrm>
-            <a:off x="381300" y="685800"/>
-            <a:ext cx="6096000" cy="3429000"/>
-          </a:xfrm>
-          <a:custGeom>
-            <a:avLst/>
-            <a:gdLst/>
-            <a:ahLst/>
-            <a:cxnLst/>
-            <a:rect l="l" t="t" r="r" b="b"/>
-            <a:pathLst>
-              <a:path w="120000" h="120000" extrusionOk="0">
-                <a:moveTo>
-                  <a:pt x="0" y="0"/>
-                </a:moveTo>
-                <a:lnTo>
-                  <a:pt x="120000" y="0"/>
-                </a:lnTo>
-                <a:lnTo>
-                  <a:pt x="120000" y="120000"/>
-                </a:lnTo>
-                <a:lnTo>
-                  <a:pt x="0" y="120000"/>
-                </a:lnTo>
-                <a:close/>
-              </a:path>
-            </a:pathLst>
-          </a:custGeom>
-        </p:spPr>
-      </p:sp>
-      <p:sp>
-        <p:nvSpPr>
-          <p:cNvPr id="347" name="Google Shape;347;g716bd5a473_1_313:notes"/>
-          <p:cNvSpPr txBox="1">
-            <a:spLocks noGrp="1"/>
-          </p:cNvSpPr>
-          <p:nvPr>
-            <p:ph type="body" idx="1"/>
-          </p:nvPr>
-        </p:nvSpPr>
-        <p:spPr>
-          <a:xfrm>
-            <a:off x="685800" y="4343400"/>
-            <a:ext cx="5486400" cy="4114800"/>
-          </a:xfrm>
-          <a:prstGeom prst="rect">
-            <a:avLst/>
-          </a:prstGeom>
-        </p:spPr>
-        <p:txBody>
-          <a:bodyPr spcFirstLastPara="1" wrap="square" lIns="91425" tIns="91425" rIns="91425" bIns="91425" anchor="t" anchorCtr="0">
-            <a:noAutofit/>
-          </a:bodyPr>
-          <a:lstStyle/>
-          <a:p>
-            <a:pPr marL="0" lvl="0" indent="0" algn="l" rtl="0">
-              <a:spcBef>
-                <a:spcPts val="0"/>
-              </a:spcBef>
-              <a:spcAft>
-                <a:spcPts val="0"/>
-              </a:spcAft>
-              <a:buNone/>
-            </a:pPr>
-            <a:endParaRPr/>
-          </a:p>
-        </p:txBody>
-      </p:sp>
-    </p:spTree>
-  </p:cSld>
-  <p:clrMapOvr>
-    <a:masterClrMapping/>
-  </p:clrMapOvr>
-</p:notes>
-</file>
-
-<file path=ppt/notesSlides/notesSlide11.xml><?xml version="1.0" encoding="utf-8"?>
-<p:notes xmlns:a="http://schemas.openxmlformats.org/drawingml/2006/main" xmlns:r="http://schemas.openxmlformats.org/officeDocument/2006/relationships" xmlns:p="http://schemas.openxmlformats.org/presentationml/2006/main" showMasterSp="0" showMasterPhAnim="0">
-  <p:cSld>
-    <p:spTree>
-      <p:nvGrpSpPr>
-        <p:cNvPr id="1" name="Shape 352"/>
-        <p:cNvGrpSpPr/>
-        <p:nvPr/>
-      </p:nvGrpSpPr>
-      <p:grpSpPr>
-        <a:xfrm>
-          <a:off x="0" y="0"/>
-          <a:ext cx="0" cy="0"/>
-          <a:chOff x="0" y="0"/>
-          <a:chExt cx="0" cy="0"/>
-        </a:xfrm>
-      </p:grpSpPr>
-      <p:sp>
-        <p:nvSpPr>
-          <p:cNvPr id="353" name="Google Shape;353;g716bd5a473_1_393:notes"/>
-          <p:cNvSpPr>
-            <a:spLocks noGrp="1" noRot="1" noChangeAspect="1"/>
-          </p:cNvSpPr>
-          <p:nvPr>
-            <p:ph type="sldImg" idx="2"/>
-          </p:nvPr>
-        </p:nvSpPr>
-        <p:spPr>
-          <a:xfrm>
-            <a:off x="381300" y="685800"/>
-            <a:ext cx="6096000" cy="3429000"/>
-          </a:xfrm>
-          <a:custGeom>
-            <a:avLst/>
-            <a:gdLst/>
-            <a:ahLst/>
-            <a:cxnLst/>
-            <a:rect l="l" t="t" r="r" b="b"/>
-            <a:pathLst>
-              <a:path w="120000" h="120000" extrusionOk="0">
-                <a:moveTo>
-                  <a:pt x="0" y="0"/>
-                </a:moveTo>
-                <a:lnTo>
-                  <a:pt x="120000" y="0"/>
-                </a:lnTo>
-                <a:lnTo>
-                  <a:pt x="120000" y="120000"/>
-                </a:lnTo>
-                <a:lnTo>
-                  <a:pt x="0" y="120000"/>
-                </a:lnTo>
-                <a:close/>
-              </a:path>
-            </a:pathLst>
-          </a:custGeom>
-        </p:spPr>
-      </p:sp>
-      <p:sp>
-        <p:nvSpPr>
-          <p:cNvPr id="354" name="Google Shape;354;g716bd5a473_1_393:notes"/>
-          <p:cNvSpPr txBox="1">
-            <a:spLocks noGrp="1"/>
-          </p:cNvSpPr>
-          <p:nvPr>
-            <p:ph type="body" idx="1"/>
-          </p:nvPr>
-        </p:nvSpPr>
-        <p:spPr>
-          <a:xfrm>
-            <a:off x="685800" y="4343400"/>
-            <a:ext cx="5486400" cy="4114800"/>
-          </a:xfrm>
-          <a:prstGeom prst="rect">
-            <a:avLst/>
-          </a:prstGeom>
-        </p:spPr>
-        <p:txBody>
-          <a:bodyPr spcFirstLastPara="1" wrap="square" lIns="91425" tIns="91425" rIns="91425" bIns="91425" anchor="t" anchorCtr="0">
-            <a:noAutofit/>
-          </a:bodyPr>
-          <a:lstStyle/>
-          <a:p>
-            <a:pPr marL="0" lvl="0" indent="0" algn="l" rtl="0">
-              <a:spcBef>
-                <a:spcPts val="0"/>
-              </a:spcBef>
-              <a:spcAft>
-                <a:spcPts val="0"/>
-              </a:spcAft>
-              <a:buNone/>
-            </a:pPr>
-            <a:endParaRPr/>
-          </a:p>
-        </p:txBody>
-      </p:sp>
-    </p:spTree>
-  </p:cSld>
-  <p:clrMapOvr>
-    <a:masterClrMapping/>
-  </p:clrMapOvr>
-</p:notes>
-</file>
-
-<file path=ppt/notesSlides/notesSlide12.xml><?xml version="1.0" encoding="utf-8"?>
-<p:notes xmlns:a="http://schemas.openxmlformats.org/drawingml/2006/main" xmlns:r="http://schemas.openxmlformats.org/officeDocument/2006/relationships" xmlns:p="http://schemas.openxmlformats.org/presentationml/2006/main" showMasterSp="0" showMasterPhAnim="0">
-  <p:cSld>
-    <p:spTree>
-      <p:nvGrpSpPr>
         <p:cNvPr id="1" name="Shape 358"/>
         <p:cNvGrpSpPr/>
         <p:nvPr/>
@@ -1145,7 +939,7 @@
 </p:notes>
 </file>
 
-<file path=ppt/notesSlides/notesSlide13.xml><?xml version="1.0" encoding="utf-8"?>
+<file path=ppt/notesSlides/notesSlide11.xml><?xml version="1.0" encoding="utf-8"?>
 <p:notes xmlns:a="http://schemas.openxmlformats.org/drawingml/2006/main" xmlns:r="http://schemas.openxmlformats.org/officeDocument/2006/relationships" xmlns:p="http://schemas.openxmlformats.org/presentationml/2006/main" showMasterSp="0" showMasterPhAnim="0">
   <p:cSld>
     <p:spTree>
@@ -1566,214 +1360,6 @@
   <p:cSld>
     <p:spTree>
       <p:nvGrpSpPr>
-        <p:cNvPr id="1" name="Shape 302"/>
-        <p:cNvGrpSpPr/>
-        <p:nvPr/>
-      </p:nvGrpSpPr>
-      <p:grpSpPr>
-        <a:xfrm>
-          <a:off x="0" y="0"/>
-          <a:ext cx="0" cy="0"/>
-          <a:chOff x="0" y="0"/>
-          <a:chExt cx="0" cy="0"/>
-        </a:xfrm>
-      </p:grpSpPr>
-      <p:sp>
-        <p:nvSpPr>
-          <p:cNvPr id="303" name="Google Shape;303;g716bd5a473_1_338:notes"/>
-          <p:cNvSpPr>
-            <a:spLocks noGrp="1" noRot="1" noChangeAspect="1"/>
-          </p:cNvSpPr>
-          <p:nvPr>
-            <p:ph type="sldImg" idx="2"/>
-          </p:nvPr>
-        </p:nvSpPr>
-        <p:spPr>
-          <a:xfrm>
-            <a:off x="381000" y="685800"/>
-            <a:ext cx="6096000" cy="3429000"/>
-          </a:xfrm>
-          <a:custGeom>
-            <a:avLst/>
-            <a:gdLst/>
-            <a:ahLst/>
-            <a:cxnLst/>
-            <a:rect l="l" t="t" r="r" b="b"/>
-            <a:pathLst>
-              <a:path w="120000" h="120000" extrusionOk="0">
-                <a:moveTo>
-                  <a:pt x="0" y="0"/>
-                </a:moveTo>
-                <a:lnTo>
-                  <a:pt x="120000" y="0"/>
-                </a:lnTo>
-                <a:lnTo>
-                  <a:pt x="120000" y="120000"/>
-                </a:lnTo>
-                <a:lnTo>
-                  <a:pt x="0" y="120000"/>
-                </a:lnTo>
-                <a:close/>
-              </a:path>
-            </a:pathLst>
-          </a:custGeom>
-        </p:spPr>
-      </p:sp>
-      <p:sp>
-        <p:nvSpPr>
-          <p:cNvPr id="304" name="Google Shape;304;g716bd5a473_1_338:notes"/>
-          <p:cNvSpPr txBox="1">
-            <a:spLocks noGrp="1"/>
-          </p:cNvSpPr>
-          <p:nvPr>
-            <p:ph type="body" idx="1"/>
-          </p:nvPr>
-        </p:nvSpPr>
-        <p:spPr>
-          <a:xfrm>
-            <a:off x="685800" y="4343400"/>
-            <a:ext cx="5486400" cy="4114800"/>
-          </a:xfrm>
-          <a:prstGeom prst="rect">
-            <a:avLst/>
-          </a:prstGeom>
-        </p:spPr>
-        <p:txBody>
-          <a:bodyPr spcFirstLastPara="1" wrap="square" lIns="91425" tIns="91425" rIns="91425" bIns="91425" anchor="t" anchorCtr="0">
-            <a:noAutofit/>
-          </a:bodyPr>
-          <a:lstStyle/>
-          <a:p>
-            <a:pPr marL="0" lvl="0" indent="0" algn="l" rtl="0">
-              <a:spcBef>
-                <a:spcPts val="0"/>
-              </a:spcBef>
-              <a:spcAft>
-                <a:spcPts val="0"/>
-              </a:spcAft>
-              <a:buNone/>
-            </a:pPr>
-            <a:endParaRPr/>
-          </a:p>
-        </p:txBody>
-      </p:sp>
-    </p:spTree>
-  </p:cSld>
-  <p:clrMapOvr>
-    <a:masterClrMapping/>
-  </p:clrMapOvr>
-</p:notes>
-</file>
-
-<file path=ppt/notesSlides/notesSlide6.xml><?xml version="1.0" encoding="utf-8"?>
-<p:notes xmlns:a="http://schemas.openxmlformats.org/drawingml/2006/main" xmlns:r="http://schemas.openxmlformats.org/officeDocument/2006/relationships" xmlns:p="http://schemas.openxmlformats.org/presentationml/2006/main" showMasterSp="0" showMasterPhAnim="0">
-  <p:cSld>
-    <p:spTree>
-      <p:nvGrpSpPr>
-        <p:cNvPr id="1" name="Shape 311"/>
-        <p:cNvGrpSpPr/>
-        <p:nvPr/>
-      </p:nvGrpSpPr>
-      <p:grpSpPr>
-        <a:xfrm>
-          <a:off x="0" y="0"/>
-          <a:ext cx="0" cy="0"/>
-          <a:chOff x="0" y="0"/>
-          <a:chExt cx="0" cy="0"/>
-        </a:xfrm>
-      </p:grpSpPr>
-      <p:sp>
-        <p:nvSpPr>
-          <p:cNvPr id="312" name="Google Shape;312;g716bd5a473_1_328:notes"/>
-          <p:cNvSpPr>
-            <a:spLocks noGrp="1" noRot="1" noChangeAspect="1"/>
-          </p:cNvSpPr>
-          <p:nvPr>
-            <p:ph type="sldImg" idx="2"/>
-          </p:nvPr>
-        </p:nvSpPr>
-        <p:spPr>
-          <a:xfrm>
-            <a:off x="381000" y="685800"/>
-            <a:ext cx="6096000" cy="3429000"/>
-          </a:xfrm>
-          <a:custGeom>
-            <a:avLst/>
-            <a:gdLst/>
-            <a:ahLst/>
-            <a:cxnLst/>
-            <a:rect l="l" t="t" r="r" b="b"/>
-            <a:pathLst>
-              <a:path w="120000" h="120000" extrusionOk="0">
-                <a:moveTo>
-                  <a:pt x="0" y="0"/>
-                </a:moveTo>
-                <a:lnTo>
-                  <a:pt x="120000" y="0"/>
-                </a:lnTo>
-                <a:lnTo>
-                  <a:pt x="120000" y="120000"/>
-                </a:lnTo>
-                <a:lnTo>
-                  <a:pt x="0" y="120000"/>
-                </a:lnTo>
-                <a:close/>
-              </a:path>
-            </a:pathLst>
-          </a:custGeom>
-        </p:spPr>
-      </p:sp>
-      <p:sp>
-        <p:nvSpPr>
-          <p:cNvPr id="313" name="Google Shape;313;g716bd5a473_1_328:notes"/>
-          <p:cNvSpPr txBox="1">
-            <a:spLocks noGrp="1"/>
-          </p:cNvSpPr>
-          <p:nvPr>
-            <p:ph type="body" idx="1"/>
-          </p:nvPr>
-        </p:nvSpPr>
-        <p:spPr>
-          <a:xfrm>
-            <a:off x="685800" y="4343400"/>
-            <a:ext cx="5486400" cy="4114800"/>
-          </a:xfrm>
-          <a:prstGeom prst="rect">
-            <a:avLst/>
-          </a:prstGeom>
-        </p:spPr>
-        <p:txBody>
-          <a:bodyPr spcFirstLastPara="1" wrap="square" lIns="91425" tIns="91425" rIns="91425" bIns="91425" anchor="t" anchorCtr="0">
-            <a:noAutofit/>
-          </a:bodyPr>
-          <a:lstStyle/>
-          <a:p>
-            <a:pPr marL="0" lvl="0" indent="0" algn="l" rtl="0">
-              <a:spcBef>
-                <a:spcPts val="0"/>
-              </a:spcBef>
-              <a:spcAft>
-                <a:spcPts val="0"/>
-              </a:spcAft>
-              <a:buNone/>
-            </a:pPr>
-            <a:endParaRPr/>
-          </a:p>
-        </p:txBody>
-      </p:sp>
-    </p:spTree>
-  </p:cSld>
-  <p:clrMapOvr>
-    <a:masterClrMapping/>
-  </p:clrMapOvr>
-</p:notes>
-</file>
-
-<file path=ppt/notesSlides/notesSlide7.xml><?xml version="1.0" encoding="utf-8"?>
-<p:notes xmlns:a="http://schemas.openxmlformats.org/drawingml/2006/main" xmlns:r="http://schemas.openxmlformats.org/officeDocument/2006/relationships" xmlns:p="http://schemas.openxmlformats.org/presentationml/2006/main" showMasterSp="0" showMasterPhAnim="0">
-  <p:cSld>
-    <p:spTree>
-      <p:nvGrpSpPr>
         <p:cNvPr id="1" name="Shape 317"/>
         <p:cNvGrpSpPr/>
         <p:nvPr/>
@@ -1873,7 +1459,7 @@
 </p:notes>
 </file>
 
-<file path=ppt/notesSlides/notesSlide8.xml><?xml version="1.0" encoding="utf-8"?>
+<file path=ppt/notesSlides/notesSlide6.xml><?xml version="1.0" encoding="utf-8"?>
 <p:notes xmlns:a="http://schemas.openxmlformats.org/drawingml/2006/main" xmlns:r="http://schemas.openxmlformats.org/officeDocument/2006/relationships" xmlns:p="http://schemas.openxmlformats.org/presentationml/2006/main" showMasterSp="0" showMasterPhAnim="0">
   <p:cSld>
     <p:spTree>
@@ -1977,7 +1563,7 @@
 </p:notes>
 </file>
 
-<file path=ppt/notesSlides/notesSlide9.xml><?xml version="1.0" encoding="utf-8"?>
+<file path=ppt/notesSlides/notesSlide7.xml><?xml version="1.0" encoding="utf-8"?>
 <p:notes xmlns:a="http://schemas.openxmlformats.org/drawingml/2006/main" xmlns:r="http://schemas.openxmlformats.org/officeDocument/2006/relationships" xmlns:p="http://schemas.openxmlformats.org/presentationml/2006/main" showMasterSp="0" showMasterPhAnim="0">
   <p:cSld>
     <p:spTree>
@@ -2038,6 +1624,214 @@
       <p:sp>
         <p:nvSpPr>
           <p:cNvPr id="334" name="Google Shape;334;g716bd5a473_1_384:notes"/>
+          <p:cNvSpPr txBox="1">
+            <a:spLocks noGrp="1"/>
+          </p:cNvSpPr>
+          <p:nvPr>
+            <p:ph type="body" idx="1"/>
+          </p:nvPr>
+        </p:nvSpPr>
+        <p:spPr>
+          <a:xfrm>
+            <a:off x="685800" y="4343400"/>
+            <a:ext cx="5486400" cy="4114800"/>
+          </a:xfrm>
+          <a:prstGeom prst="rect">
+            <a:avLst/>
+          </a:prstGeom>
+        </p:spPr>
+        <p:txBody>
+          <a:bodyPr spcFirstLastPara="1" wrap="square" lIns="91425" tIns="91425" rIns="91425" bIns="91425" anchor="t" anchorCtr="0">
+            <a:noAutofit/>
+          </a:bodyPr>
+          <a:lstStyle/>
+          <a:p>
+            <a:pPr marL="0" lvl="0" indent="0" algn="l" rtl="0">
+              <a:spcBef>
+                <a:spcPts val="0"/>
+              </a:spcBef>
+              <a:spcAft>
+                <a:spcPts val="0"/>
+              </a:spcAft>
+              <a:buNone/>
+            </a:pPr>
+            <a:endParaRPr/>
+          </a:p>
+        </p:txBody>
+      </p:sp>
+    </p:spTree>
+  </p:cSld>
+  <p:clrMapOvr>
+    <a:masterClrMapping/>
+  </p:clrMapOvr>
+</p:notes>
+</file>
+
+<file path=ppt/notesSlides/notesSlide8.xml><?xml version="1.0" encoding="utf-8"?>
+<p:notes xmlns:a="http://schemas.openxmlformats.org/drawingml/2006/main" xmlns:r="http://schemas.openxmlformats.org/officeDocument/2006/relationships" xmlns:p="http://schemas.openxmlformats.org/presentationml/2006/main" showMasterSp="0" showMasterPhAnim="0">
+  <p:cSld>
+    <p:spTree>
+      <p:nvGrpSpPr>
+        <p:cNvPr id="1" name="Shape 345"/>
+        <p:cNvGrpSpPr/>
+        <p:nvPr/>
+      </p:nvGrpSpPr>
+      <p:grpSpPr>
+        <a:xfrm>
+          <a:off x="0" y="0"/>
+          <a:ext cx="0" cy="0"/>
+          <a:chOff x="0" y="0"/>
+          <a:chExt cx="0" cy="0"/>
+        </a:xfrm>
+      </p:grpSpPr>
+      <p:sp>
+        <p:nvSpPr>
+          <p:cNvPr id="346" name="Google Shape;346;g716bd5a473_1_313:notes"/>
+          <p:cNvSpPr>
+            <a:spLocks noGrp="1" noRot="1" noChangeAspect="1"/>
+          </p:cNvSpPr>
+          <p:nvPr>
+            <p:ph type="sldImg" idx="2"/>
+          </p:nvPr>
+        </p:nvSpPr>
+        <p:spPr>
+          <a:xfrm>
+            <a:off x="381300" y="685800"/>
+            <a:ext cx="6096000" cy="3429000"/>
+          </a:xfrm>
+          <a:custGeom>
+            <a:avLst/>
+            <a:gdLst/>
+            <a:ahLst/>
+            <a:cxnLst/>
+            <a:rect l="l" t="t" r="r" b="b"/>
+            <a:pathLst>
+              <a:path w="120000" h="120000" extrusionOk="0">
+                <a:moveTo>
+                  <a:pt x="0" y="0"/>
+                </a:moveTo>
+                <a:lnTo>
+                  <a:pt x="120000" y="0"/>
+                </a:lnTo>
+                <a:lnTo>
+                  <a:pt x="120000" y="120000"/>
+                </a:lnTo>
+                <a:lnTo>
+                  <a:pt x="0" y="120000"/>
+                </a:lnTo>
+                <a:close/>
+              </a:path>
+            </a:pathLst>
+          </a:custGeom>
+        </p:spPr>
+      </p:sp>
+      <p:sp>
+        <p:nvSpPr>
+          <p:cNvPr id="347" name="Google Shape;347;g716bd5a473_1_313:notes"/>
+          <p:cNvSpPr txBox="1">
+            <a:spLocks noGrp="1"/>
+          </p:cNvSpPr>
+          <p:nvPr>
+            <p:ph type="body" idx="1"/>
+          </p:nvPr>
+        </p:nvSpPr>
+        <p:spPr>
+          <a:xfrm>
+            <a:off x="685800" y="4343400"/>
+            <a:ext cx="5486400" cy="4114800"/>
+          </a:xfrm>
+          <a:prstGeom prst="rect">
+            <a:avLst/>
+          </a:prstGeom>
+        </p:spPr>
+        <p:txBody>
+          <a:bodyPr spcFirstLastPara="1" wrap="square" lIns="91425" tIns="91425" rIns="91425" bIns="91425" anchor="t" anchorCtr="0">
+            <a:noAutofit/>
+          </a:bodyPr>
+          <a:lstStyle/>
+          <a:p>
+            <a:pPr marL="0" lvl="0" indent="0" algn="l" rtl="0">
+              <a:spcBef>
+                <a:spcPts val="0"/>
+              </a:spcBef>
+              <a:spcAft>
+                <a:spcPts val="0"/>
+              </a:spcAft>
+              <a:buNone/>
+            </a:pPr>
+            <a:endParaRPr/>
+          </a:p>
+        </p:txBody>
+      </p:sp>
+    </p:spTree>
+  </p:cSld>
+  <p:clrMapOvr>
+    <a:masterClrMapping/>
+  </p:clrMapOvr>
+</p:notes>
+</file>
+
+<file path=ppt/notesSlides/notesSlide9.xml><?xml version="1.0" encoding="utf-8"?>
+<p:notes xmlns:a="http://schemas.openxmlformats.org/drawingml/2006/main" xmlns:r="http://schemas.openxmlformats.org/officeDocument/2006/relationships" xmlns:p="http://schemas.openxmlformats.org/presentationml/2006/main" showMasterSp="0" showMasterPhAnim="0">
+  <p:cSld>
+    <p:spTree>
+      <p:nvGrpSpPr>
+        <p:cNvPr id="1" name="Shape 352"/>
+        <p:cNvGrpSpPr/>
+        <p:nvPr/>
+      </p:nvGrpSpPr>
+      <p:grpSpPr>
+        <a:xfrm>
+          <a:off x="0" y="0"/>
+          <a:ext cx="0" cy="0"/>
+          <a:chOff x="0" y="0"/>
+          <a:chExt cx="0" cy="0"/>
+        </a:xfrm>
+      </p:grpSpPr>
+      <p:sp>
+        <p:nvSpPr>
+          <p:cNvPr id="353" name="Google Shape;353;g716bd5a473_1_393:notes"/>
+          <p:cNvSpPr>
+            <a:spLocks noGrp="1" noRot="1" noChangeAspect="1"/>
+          </p:cNvSpPr>
+          <p:nvPr>
+            <p:ph type="sldImg" idx="2"/>
+          </p:nvPr>
+        </p:nvSpPr>
+        <p:spPr>
+          <a:xfrm>
+            <a:off x="381300" y="685800"/>
+            <a:ext cx="6096000" cy="3429000"/>
+          </a:xfrm>
+          <a:custGeom>
+            <a:avLst/>
+            <a:gdLst/>
+            <a:ahLst/>
+            <a:cxnLst/>
+            <a:rect l="l" t="t" r="r" b="b"/>
+            <a:pathLst>
+              <a:path w="120000" h="120000" extrusionOk="0">
+                <a:moveTo>
+                  <a:pt x="0" y="0"/>
+                </a:moveTo>
+                <a:lnTo>
+                  <a:pt x="120000" y="0"/>
+                </a:lnTo>
+                <a:lnTo>
+                  <a:pt x="120000" y="120000"/>
+                </a:lnTo>
+                <a:lnTo>
+                  <a:pt x="0" y="120000"/>
+                </a:lnTo>
+                <a:close/>
+              </a:path>
+            </a:pathLst>
+          </a:custGeom>
+        </p:spPr>
+      </p:sp>
+      <p:sp>
+        <p:nvSpPr>
+          <p:cNvPr id="354" name="Google Shape;354;g716bd5a473_1_393:notes"/>
           <p:cNvSpPr txBox="1">
             <a:spLocks noGrp="1"/>
           </p:cNvSpPr>
@@ -14565,204 +14359,6 @@
   <p:cSld>
     <p:spTree>
       <p:nvGrpSpPr>
-        <p:cNvPr id="1" name="Shape 329"/>
-        <p:cNvGrpSpPr/>
-        <p:nvPr/>
-      </p:nvGrpSpPr>
-      <p:grpSpPr>
-        <a:xfrm>
-          <a:off x="0" y="0"/>
-          <a:ext cx="0" cy="0"/>
-          <a:chOff x="0" y="0"/>
-          <a:chExt cx="0" cy="0"/>
-        </a:xfrm>
-      </p:grpSpPr>
-      <p:sp>
-        <p:nvSpPr>
-          <p:cNvPr id="330" name="Google Shape;330;p20"/>
-          <p:cNvSpPr txBox="1">
-            <a:spLocks noGrp="1"/>
-          </p:cNvSpPr>
-          <p:nvPr>
-            <p:ph type="title"/>
-          </p:nvPr>
-        </p:nvSpPr>
-        <p:spPr>
-          <a:xfrm>
-            <a:off x="1303800" y="598575"/>
-            <a:ext cx="7030500" cy="999300"/>
-          </a:xfrm>
-          <a:prstGeom prst="rect">
-            <a:avLst/>
-          </a:prstGeom>
-        </p:spPr>
-        <p:txBody>
-          <a:bodyPr spcFirstLastPara="1" wrap="square" lIns="91425" tIns="91425" rIns="91425" bIns="91425" anchor="t" anchorCtr="0">
-            <a:noAutofit/>
-          </a:bodyPr>
-          <a:lstStyle/>
-          <a:p>
-            <a:pPr marL="0" lvl="0" indent="0" algn="l" rtl="0">
-              <a:spcBef>
-                <a:spcPts val="0"/>
-              </a:spcBef>
-              <a:spcAft>
-                <a:spcPts val="0"/>
-              </a:spcAft>
-              <a:buNone/>
-            </a:pPr>
-            <a:r>
-              <a:rPr lang="en"/>
-              <a:t>...contd AMT_INCOME_TOTAL vs NAME_EDUCATION_TYPE</a:t>
-            </a:r>
-            <a:endParaRPr/>
-          </a:p>
-        </p:txBody>
-      </p:sp>
-      <p:sp>
-        <p:nvSpPr>
-          <p:cNvPr id="331" name="Google Shape;331;p20"/>
-          <p:cNvSpPr txBox="1">
-            <a:spLocks noGrp="1"/>
-          </p:cNvSpPr>
-          <p:nvPr>
-            <p:ph type="body" idx="1"/>
-          </p:nvPr>
-        </p:nvSpPr>
-        <p:spPr>
-          <a:xfrm>
-            <a:off x="981976" y="1597875"/>
-            <a:ext cx="7590600" cy="3309900"/>
-          </a:xfrm>
-          <a:prstGeom prst="rect">
-            <a:avLst/>
-          </a:prstGeom>
-        </p:spPr>
-        <p:txBody>
-          <a:bodyPr spcFirstLastPara="1" wrap="square" lIns="91425" tIns="91425" rIns="91425" bIns="91425" anchor="t" anchorCtr="0">
-            <a:noAutofit/>
-          </a:bodyPr>
-          <a:lstStyle/>
-          <a:p>
-            <a:pPr marL="0" lvl="0" indent="0" algn="just" rtl="0">
-              <a:spcBef>
-                <a:spcPts val="0"/>
-              </a:spcBef>
-              <a:spcAft>
-                <a:spcPts val="0"/>
-              </a:spcAft>
-              <a:buNone/>
-            </a:pPr>
-            <a:r>
-              <a:rPr lang="en" dirty="0"/>
-              <a:t>For  clients </a:t>
-            </a:r>
-            <a:r>
-              <a:rPr lang="en-US" dirty="0"/>
-              <a:t>with payment difficulties</a:t>
-            </a:r>
-            <a:endParaRPr dirty="0"/>
-          </a:p>
-          <a:p>
-            <a:pPr marL="457200" lvl="0" indent="-311150" algn="just" rtl="0">
-              <a:spcBef>
-                <a:spcPts val="1600"/>
-              </a:spcBef>
-              <a:spcAft>
-                <a:spcPts val="0"/>
-              </a:spcAft>
-              <a:buSzPts val="1300"/>
-              <a:buChar char="●"/>
-            </a:pPr>
-            <a:r>
-              <a:rPr lang="en-US" dirty="0"/>
-              <a:t>Although academic degree seems to be in higher range, there are only 3 cases of default for clients with academic degree and those are in middle income range. </a:t>
-            </a:r>
-          </a:p>
-          <a:p>
-            <a:pPr marL="457200" lvl="0" indent="-311150" algn="just" rtl="0">
-              <a:spcBef>
-                <a:spcPts val="0"/>
-              </a:spcBef>
-              <a:spcAft>
-                <a:spcPts val="0"/>
-              </a:spcAft>
-              <a:buSzPts val="1300"/>
-              <a:buChar char="●"/>
-            </a:pPr>
-            <a:r>
-              <a:rPr lang="en-US" dirty="0"/>
-              <a:t>Clients with lower secondary education level are more likely to default for Total Income&lt; 400000</a:t>
-            </a:r>
-            <a:endParaRPr dirty="0"/>
-          </a:p>
-          <a:p>
-            <a:pPr marL="0" lvl="0" indent="0" algn="just" rtl="0">
-              <a:spcBef>
-                <a:spcPts val="1600"/>
-              </a:spcBef>
-              <a:spcAft>
-                <a:spcPts val="0"/>
-              </a:spcAft>
-              <a:buNone/>
-            </a:pPr>
-            <a:r>
-              <a:rPr lang="en" dirty="0"/>
-              <a:t>For clients </a:t>
-            </a:r>
-            <a:r>
-              <a:rPr lang="en-US" dirty="0"/>
-              <a:t>without  payment difficulties</a:t>
-            </a:r>
-            <a:endParaRPr dirty="0"/>
-          </a:p>
-          <a:p>
-            <a:pPr marL="457200" lvl="0" indent="-311150" algn="just" rtl="0">
-              <a:spcBef>
-                <a:spcPts val="1600"/>
-              </a:spcBef>
-              <a:spcAft>
-                <a:spcPts val="0"/>
-              </a:spcAft>
-              <a:buSzPts val="1300"/>
-              <a:buChar char="●"/>
-            </a:pPr>
-            <a:r>
-              <a:rPr lang="en-US" dirty="0"/>
-              <a:t>Majority of on time paying clients lies in higher range of AMT_INCOME_TOTAL</a:t>
-            </a:r>
-          </a:p>
-          <a:p>
-            <a:pPr marL="457200" lvl="0" indent="-311150" algn="just" rtl="0">
-              <a:spcBef>
-                <a:spcPts val="0"/>
-              </a:spcBef>
-              <a:spcAft>
-                <a:spcPts val="0"/>
-              </a:spcAft>
-              <a:buSzPts val="1300"/>
-              <a:buChar char="●"/>
-            </a:pPr>
-            <a:r>
-              <a:rPr lang="en-US" dirty="0"/>
-              <a:t>Clients with lower secondary who opted for large sum of loan (945000.0) have paid on time while clients of same education who took loans of moderate size (450000.0) have defaulted.</a:t>
-            </a:r>
-          </a:p>
-        </p:txBody>
-      </p:sp>
-    </p:spTree>
-  </p:cSld>
-  <p:clrMapOvr>
-    <a:masterClrMapping/>
-  </p:clrMapOvr>
-</p:sld>
-</file>
-
-<file path=ppt/slides/slide11.xml><?xml version="1.0" encoding="utf-8"?>
-<p:sld xmlns:a="http://schemas.openxmlformats.org/drawingml/2006/main" xmlns:r="http://schemas.openxmlformats.org/officeDocument/2006/relationships" xmlns:p="http://schemas.openxmlformats.org/presentationml/2006/main">
-  <p:cSld>
-    <p:spTree>
-      <p:nvGrpSpPr>
         <p:cNvPr id="1" name="Shape 335"/>
         <p:cNvGrpSpPr/>
         <p:nvPr/>
@@ -14959,7 +14555,401 @@
 </p:sld>
 </file>
 
+<file path=ppt/slides/slide11.xml><?xml version="1.0" encoding="utf-8"?>
+<p:sld xmlns:a="http://schemas.openxmlformats.org/drawingml/2006/main" xmlns:r="http://schemas.openxmlformats.org/officeDocument/2006/relationships" xmlns:p="http://schemas.openxmlformats.org/presentationml/2006/main">
+  <p:cSld>
+    <p:spTree>
+      <p:nvGrpSpPr>
+        <p:cNvPr id="1" name=""/>
+        <p:cNvGrpSpPr/>
+        <p:nvPr/>
+      </p:nvGrpSpPr>
+      <p:grpSpPr>
+        <a:xfrm>
+          <a:off x="0" y="0"/>
+          <a:ext cx="0" cy="0"/>
+          <a:chOff x="0" y="0"/>
+          <a:chExt cx="0" cy="0"/>
+        </a:xfrm>
+      </p:grpSpPr>
+      <p:sp>
+        <p:nvSpPr>
+          <p:cNvPr id="2" name="Title 1">
+            <a:extLst>
+              <a:ext uri="{FF2B5EF4-FFF2-40B4-BE49-F238E27FC236}">
+                <a16:creationId xmlns:a16="http://schemas.microsoft.com/office/drawing/2014/main" id="{A17B564D-AEAF-49FA-8E9B-4D5253303290}"/>
+              </a:ext>
+            </a:extLst>
+          </p:cNvPr>
+          <p:cNvSpPr>
+            <a:spLocks noGrp="1"/>
+          </p:cNvSpPr>
+          <p:nvPr>
+            <p:ph type="title"/>
+          </p:nvPr>
+        </p:nvSpPr>
+        <p:spPr/>
+        <p:txBody>
+          <a:bodyPr/>
+          <a:lstStyle/>
+          <a:p>
+            <a:r>
+              <a:rPr lang="en-US" dirty="0"/>
+              <a:t>Impact of Income on payment difficulties</a:t>
+            </a:r>
+          </a:p>
+        </p:txBody>
+      </p:sp>
+      <p:sp>
+        <p:nvSpPr>
+          <p:cNvPr id="3" name="Text Placeholder 2">
+            <a:extLst>
+              <a:ext uri="{FF2B5EF4-FFF2-40B4-BE49-F238E27FC236}">
+                <a16:creationId xmlns:a16="http://schemas.microsoft.com/office/drawing/2014/main" id="{66C6B8A8-A5C8-4EEA-9A9A-0D2B824D0E12}"/>
+              </a:ext>
+            </a:extLst>
+          </p:cNvPr>
+          <p:cNvSpPr>
+            <a:spLocks noGrp="1"/>
+          </p:cNvSpPr>
+          <p:nvPr>
+            <p:ph type="body" idx="1"/>
+          </p:nvPr>
+        </p:nvSpPr>
+        <p:spPr>
+          <a:xfrm>
+            <a:off x="5264524" y="1990050"/>
+            <a:ext cx="3069776" cy="2541600"/>
+          </a:xfrm>
+        </p:spPr>
+        <p:txBody>
+          <a:bodyPr/>
+          <a:lstStyle/>
+          <a:p>
+            <a:r>
+              <a:rPr lang="en-US" dirty="0"/>
+              <a:t>For people with income more than 10 lac there is very less risk of default</a:t>
+            </a:r>
+          </a:p>
+          <a:p>
+            <a:r>
+              <a:rPr lang="en-US" dirty="0"/>
+              <a:t>People with income less than 3 lacs are most likely to face difficulties in payments</a:t>
+            </a:r>
+          </a:p>
+          <a:p>
+            <a:r>
+              <a:rPr lang="en-US" dirty="0"/>
+              <a:t>More specifically, majority of people who faced difficulties had income between 1 lac and 2 lacs approximately</a:t>
+            </a:r>
+          </a:p>
+          <a:p>
+            <a:endParaRPr lang="en-US" dirty="0"/>
+          </a:p>
+        </p:txBody>
+      </p:sp>
+      <p:pic>
+        <p:nvPicPr>
+          <p:cNvPr id="4" name="Picture 3">
+            <a:extLst>
+              <a:ext uri="{FF2B5EF4-FFF2-40B4-BE49-F238E27FC236}">
+                <a16:creationId xmlns:a16="http://schemas.microsoft.com/office/drawing/2014/main" id="{768ABC91-4665-4AD7-8C8E-72778EF9DAF0}"/>
+              </a:ext>
+            </a:extLst>
+          </p:cNvPr>
+          <p:cNvPicPr>
+            <a:picLocks noChangeAspect="1"/>
+          </p:cNvPicPr>
+          <p:nvPr/>
+        </p:nvPicPr>
+        <p:blipFill rotWithShape="1">
+          <a:blip r:embed="rId2"/>
+          <a:srcRect t="2450"/>
+          <a:stretch/>
+        </p:blipFill>
+        <p:spPr>
+          <a:xfrm>
+            <a:off x="257627" y="1694329"/>
+            <a:ext cx="4777565" cy="3213785"/>
+          </a:xfrm>
+          <a:prstGeom prst="rect">
+            <a:avLst/>
+          </a:prstGeom>
+        </p:spPr>
+      </p:pic>
+    </p:spTree>
+    <p:extLst>
+      <p:ext uri="{BB962C8B-B14F-4D97-AF65-F5344CB8AC3E}">
+        <p14:creationId xmlns:p14="http://schemas.microsoft.com/office/powerpoint/2010/main" val="3234901693"/>
+      </p:ext>
+    </p:extLst>
+  </p:cSld>
+  <p:clrMapOvr>
+    <a:masterClrMapping/>
+  </p:clrMapOvr>
+</p:sld>
+</file>
+
 <file path=ppt/slides/slide12.xml><?xml version="1.0" encoding="utf-8"?>
+<p:sld xmlns:a="http://schemas.openxmlformats.org/drawingml/2006/main" xmlns:r="http://schemas.openxmlformats.org/officeDocument/2006/relationships" xmlns:p="http://schemas.openxmlformats.org/presentationml/2006/main">
+  <p:cSld>
+    <p:spTree>
+      <p:nvGrpSpPr>
+        <p:cNvPr id="1" name=""/>
+        <p:cNvGrpSpPr/>
+        <p:nvPr/>
+      </p:nvGrpSpPr>
+      <p:grpSpPr>
+        <a:xfrm>
+          <a:off x="0" y="0"/>
+          <a:ext cx="0" cy="0"/>
+          <a:chOff x="0" y="0"/>
+          <a:chExt cx="0" cy="0"/>
+        </a:xfrm>
+      </p:grpSpPr>
+      <p:sp>
+        <p:nvSpPr>
+          <p:cNvPr id="2" name="Title 1">
+            <a:extLst>
+              <a:ext uri="{FF2B5EF4-FFF2-40B4-BE49-F238E27FC236}">
+                <a16:creationId xmlns:a16="http://schemas.microsoft.com/office/drawing/2014/main" id="{A17B564D-AEAF-49FA-8E9B-4D5253303290}"/>
+              </a:ext>
+            </a:extLst>
+          </p:cNvPr>
+          <p:cNvSpPr>
+            <a:spLocks noGrp="1"/>
+          </p:cNvSpPr>
+          <p:nvPr>
+            <p:ph type="title"/>
+          </p:nvPr>
+        </p:nvSpPr>
+        <p:spPr/>
+        <p:txBody>
+          <a:bodyPr/>
+          <a:lstStyle/>
+          <a:p>
+            <a:r>
+              <a:rPr lang="en-US" dirty="0"/>
+              <a:t>Impact of Income on payment difficulties</a:t>
+            </a:r>
+          </a:p>
+        </p:txBody>
+      </p:sp>
+      <p:sp>
+        <p:nvSpPr>
+          <p:cNvPr id="3" name="Text Placeholder 2">
+            <a:extLst>
+              <a:ext uri="{FF2B5EF4-FFF2-40B4-BE49-F238E27FC236}">
+                <a16:creationId xmlns:a16="http://schemas.microsoft.com/office/drawing/2014/main" id="{66C6B8A8-A5C8-4EEA-9A9A-0D2B824D0E12}"/>
+              </a:ext>
+            </a:extLst>
+          </p:cNvPr>
+          <p:cNvSpPr>
+            <a:spLocks noGrp="1"/>
+          </p:cNvSpPr>
+          <p:nvPr>
+            <p:ph type="body" idx="1"/>
+          </p:nvPr>
+        </p:nvSpPr>
+        <p:spPr>
+          <a:xfrm>
+            <a:off x="5856194" y="1942985"/>
+            <a:ext cx="3069776" cy="2541600"/>
+          </a:xfrm>
+        </p:spPr>
+        <p:txBody>
+          <a:bodyPr/>
+          <a:lstStyle/>
+          <a:p>
+            <a:r>
+              <a:rPr lang="en-US" dirty="0"/>
+              <a:t>Upper limits of the credits in case of people with payment difficulties is less. </a:t>
+            </a:r>
+          </a:p>
+          <a:p>
+            <a:r>
+              <a:rPr lang="en-US" dirty="0"/>
+              <a:t>Most of the payment difficulties are associated with the people with incomes less than 5 lacs</a:t>
+            </a:r>
+          </a:p>
+        </p:txBody>
+      </p:sp>
+      <p:pic>
+        <p:nvPicPr>
+          <p:cNvPr id="5" name="Picture 4">
+            <a:extLst>
+              <a:ext uri="{FF2B5EF4-FFF2-40B4-BE49-F238E27FC236}">
+                <a16:creationId xmlns:a16="http://schemas.microsoft.com/office/drawing/2014/main" id="{381B7999-A2C1-4F58-9297-7A366A4F2BFE}"/>
+              </a:ext>
+            </a:extLst>
+          </p:cNvPr>
+          <p:cNvPicPr>
+            <a:picLocks noChangeAspect="1"/>
+          </p:cNvPicPr>
+          <p:nvPr/>
+        </p:nvPicPr>
+        <p:blipFill>
+          <a:blip r:embed="rId2"/>
+          <a:stretch>
+            <a:fillRect/>
+          </a:stretch>
+        </p:blipFill>
+        <p:spPr>
+          <a:xfrm>
+            <a:off x="218030" y="1764012"/>
+            <a:ext cx="5638164" cy="3379488"/>
+          </a:xfrm>
+          <a:prstGeom prst="rect">
+            <a:avLst/>
+          </a:prstGeom>
+        </p:spPr>
+      </p:pic>
+    </p:spTree>
+    <p:extLst>
+      <p:ext uri="{BB962C8B-B14F-4D97-AF65-F5344CB8AC3E}">
+        <p14:creationId xmlns:p14="http://schemas.microsoft.com/office/powerpoint/2010/main" val="2180048038"/>
+      </p:ext>
+    </p:extLst>
+  </p:cSld>
+  <p:clrMapOvr>
+    <a:masterClrMapping/>
+  </p:clrMapOvr>
+</p:sld>
+</file>
+
+<file path=ppt/slides/slide13.xml><?xml version="1.0" encoding="utf-8"?>
+<p:sld xmlns:a="http://schemas.openxmlformats.org/drawingml/2006/main" xmlns:r="http://schemas.openxmlformats.org/officeDocument/2006/relationships" xmlns:p="http://schemas.openxmlformats.org/presentationml/2006/main">
+  <p:cSld>
+    <p:spTree>
+      <p:nvGrpSpPr>
+        <p:cNvPr id="1" name=""/>
+        <p:cNvGrpSpPr/>
+        <p:nvPr/>
+      </p:nvGrpSpPr>
+      <p:grpSpPr>
+        <a:xfrm>
+          <a:off x="0" y="0"/>
+          <a:ext cx="0" cy="0"/>
+          <a:chOff x="0" y="0"/>
+          <a:chExt cx="0" cy="0"/>
+        </a:xfrm>
+      </p:grpSpPr>
+      <p:sp>
+        <p:nvSpPr>
+          <p:cNvPr id="2" name="Title 1">
+            <a:extLst>
+              <a:ext uri="{FF2B5EF4-FFF2-40B4-BE49-F238E27FC236}">
+                <a16:creationId xmlns:a16="http://schemas.microsoft.com/office/drawing/2014/main" id="{49F510C3-5C15-479D-9FCF-D8C5C09BD738}"/>
+              </a:ext>
+            </a:extLst>
+          </p:cNvPr>
+          <p:cNvSpPr>
+            <a:spLocks noGrp="1"/>
+          </p:cNvSpPr>
+          <p:nvPr>
+            <p:ph type="title"/>
+          </p:nvPr>
+        </p:nvSpPr>
+        <p:spPr/>
+        <p:txBody>
+          <a:bodyPr/>
+          <a:lstStyle/>
+          <a:p>
+            <a:r>
+              <a:rPr lang="en-US" dirty="0"/>
+              <a:t>Applicant relation with bank</a:t>
+            </a:r>
+          </a:p>
+        </p:txBody>
+      </p:sp>
+      <p:sp>
+        <p:nvSpPr>
+          <p:cNvPr id="3" name="Text Placeholder 2">
+            <a:extLst>
+              <a:ext uri="{FF2B5EF4-FFF2-40B4-BE49-F238E27FC236}">
+                <a16:creationId xmlns:a16="http://schemas.microsoft.com/office/drawing/2014/main" id="{0BF77C72-3684-4494-806E-3123F8912A23}"/>
+              </a:ext>
+            </a:extLst>
+          </p:cNvPr>
+          <p:cNvSpPr>
+            <a:spLocks noGrp="1"/>
+          </p:cNvSpPr>
+          <p:nvPr>
+            <p:ph type="body" idx="1"/>
+          </p:nvPr>
+        </p:nvSpPr>
+        <p:spPr>
+          <a:xfrm>
+            <a:off x="5317747" y="1949708"/>
+            <a:ext cx="3369054" cy="2541600"/>
+          </a:xfrm>
+        </p:spPr>
+        <p:txBody>
+          <a:bodyPr/>
+          <a:lstStyle/>
+          <a:p>
+            <a:r>
+              <a:rPr lang="en-US" dirty="0"/>
+              <a:t> Most of the applications are from Repeaters. </a:t>
+            </a:r>
+          </a:p>
+          <a:p>
+            <a:r>
+              <a:rPr lang="en-US" dirty="0"/>
+              <a:t>Clients are loyal to the bank</a:t>
+            </a:r>
+          </a:p>
+          <a:p>
+            <a:r>
+              <a:rPr lang="en-US" dirty="0"/>
+              <a:t>There are decent New applications too. Hence, the banks might have some attractive offers since it is attracting new applications too</a:t>
+            </a:r>
+          </a:p>
+        </p:txBody>
+      </p:sp>
+      <p:pic>
+        <p:nvPicPr>
+          <p:cNvPr id="4" name="Picture 3">
+            <a:extLst>
+              <a:ext uri="{FF2B5EF4-FFF2-40B4-BE49-F238E27FC236}">
+                <a16:creationId xmlns:a16="http://schemas.microsoft.com/office/drawing/2014/main" id="{65019141-88A1-4E13-AE49-D7EE3FABFADF}"/>
+              </a:ext>
+            </a:extLst>
+          </p:cNvPr>
+          <p:cNvPicPr>
+            <a:picLocks noChangeAspect="1"/>
+          </p:cNvPicPr>
+          <p:nvPr/>
+        </p:nvPicPr>
+        <p:blipFill rotWithShape="1">
+          <a:blip r:embed="rId2"/>
+          <a:srcRect l="5202" r="16541"/>
+          <a:stretch/>
+        </p:blipFill>
+        <p:spPr>
+          <a:xfrm>
+            <a:off x="457199" y="2049774"/>
+            <a:ext cx="4323229" cy="2771775"/>
+          </a:xfrm>
+          <a:prstGeom prst="rect">
+            <a:avLst/>
+          </a:prstGeom>
+        </p:spPr>
+      </p:pic>
+    </p:spTree>
+    <p:extLst>
+      <p:ext uri="{BB962C8B-B14F-4D97-AF65-F5344CB8AC3E}">
+        <p14:creationId xmlns:p14="http://schemas.microsoft.com/office/powerpoint/2010/main" val="3716173416"/>
+      </p:ext>
+    </p:extLst>
+  </p:cSld>
+  <p:clrMapOvr>
+    <a:masterClrMapping/>
+  </p:clrMapOvr>
+</p:sld>
+</file>
+
+<file path=ppt/slides/slide14.xml><?xml version="1.0" encoding="utf-8"?>
 <p:sld xmlns:a="http://schemas.openxmlformats.org/drawingml/2006/main" xmlns:r="http://schemas.openxmlformats.org/officeDocument/2006/relationships" xmlns:p="http://schemas.openxmlformats.org/presentationml/2006/main">
   <p:cSld>
     <p:spTree>
@@ -15146,7 +15136,7 @@
 </p:sld>
 </file>
 
-<file path=ppt/slides/slide13.xml><?xml version="1.0" encoding="utf-8"?>
+<file path=ppt/slides/slide15.xml><?xml version="1.0" encoding="utf-8"?>
 <p:sld xmlns:a="http://schemas.openxmlformats.org/drawingml/2006/main" xmlns:r="http://schemas.openxmlformats.org/officeDocument/2006/relationships" xmlns:p="http://schemas.openxmlformats.org/presentationml/2006/main">
   <p:cSld>
     <p:spTree>
@@ -15339,7 +15329,7 @@
 </p:sld>
 </file>
 
-<file path=ppt/slides/slide14.xml><?xml version="1.0" encoding="utf-8"?>
+<file path=ppt/slides/slide16.xml><?xml version="1.0" encoding="utf-8"?>
 <p:sld xmlns:a="http://schemas.openxmlformats.org/drawingml/2006/main" xmlns:r="http://schemas.openxmlformats.org/officeDocument/2006/relationships" xmlns:p="http://schemas.openxmlformats.org/presentationml/2006/main">
   <p:cSld>
     <p:spTree>
@@ -15512,7 +15502,7 @@
 </p:sld>
 </file>
 
-<file path=ppt/slides/slide15.xml><?xml version="1.0" encoding="utf-8"?>
+<file path=ppt/slides/slide17.xml><?xml version="1.0" encoding="utf-8"?>
 <p:sld xmlns:a="http://schemas.openxmlformats.org/drawingml/2006/main" xmlns:r="http://schemas.openxmlformats.org/officeDocument/2006/relationships" xmlns:p="http://schemas.openxmlformats.org/presentationml/2006/main">
   <p:cSld>
     <p:spTree>
@@ -16056,6 +16046,127 @@
   <p:cSld>
     <p:spTree>
       <p:nvGrpSpPr>
+        <p:cNvPr id="1" name=""/>
+        <p:cNvGrpSpPr/>
+        <p:nvPr/>
+      </p:nvGrpSpPr>
+      <p:grpSpPr>
+        <a:xfrm>
+          <a:off x="0" y="0"/>
+          <a:ext cx="0" cy="0"/>
+          <a:chOff x="0" y="0"/>
+          <a:chExt cx="0" cy="0"/>
+        </a:xfrm>
+      </p:grpSpPr>
+      <p:sp>
+        <p:nvSpPr>
+          <p:cNvPr id="2" name="Title 1">
+            <a:extLst>
+              <a:ext uri="{FF2B5EF4-FFF2-40B4-BE49-F238E27FC236}">
+                <a16:creationId xmlns:a16="http://schemas.microsoft.com/office/drawing/2014/main" id="{F941AEED-97EA-4FC5-A1A4-0BC6A696121C}"/>
+              </a:ext>
+            </a:extLst>
+          </p:cNvPr>
+          <p:cNvSpPr>
+            <a:spLocks noGrp="1"/>
+          </p:cNvSpPr>
+          <p:nvPr>
+            <p:ph type="title"/>
+          </p:nvPr>
+        </p:nvSpPr>
+        <p:spPr/>
+        <p:txBody>
+          <a:bodyPr/>
+          <a:lstStyle/>
+          <a:p>
+            <a:r>
+              <a:rPr lang="en-US" dirty="0"/>
+              <a:t>Ratio of payment defaults	</a:t>
+            </a:r>
+          </a:p>
+        </p:txBody>
+      </p:sp>
+      <p:sp>
+        <p:nvSpPr>
+          <p:cNvPr id="3" name="Text Placeholder 2">
+            <a:extLst>
+              <a:ext uri="{FF2B5EF4-FFF2-40B4-BE49-F238E27FC236}">
+                <a16:creationId xmlns:a16="http://schemas.microsoft.com/office/drawing/2014/main" id="{36BCA581-CE2D-4C65-87F7-40E8B4C89BA0}"/>
+              </a:ext>
+            </a:extLst>
+          </p:cNvPr>
+          <p:cNvSpPr>
+            <a:spLocks noGrp="1"/>
+          </p:cNvSpPr>
+          <p:nvPr>
+            <p:ph type="body" idx="1"/>
+          </p:nvPr>
+        </p:nvSpPr>
+        <p:spPr>
+          <a:xfrm>
+            <a:off x="5439335" y="1990050"/>
+            <a:ext cx="2894965" cy="2541600"/>
+          </a:xfrm>
+        </p:spPr>
+        <p:txBody>
+          <a:bodyPr/>
+          <a:lstStyle/>
+          <a:p>
+            <a:r>
+              <a:rPr lang="en-US" dirty="0"/>
+              <a:t>91.9% people did not face any payment difficulties while 8.1 % did. </a:t>
+            </a:r>
+          </a:p>
+        </p:txBody>
+      </p:sp>
+      <p:pic>
+        <p:nvPicPr>
+          <p:cNvPr id="5" name="Picture 4">
+            <a:extLst>
+              <a:ext uri="{FF2B5EF4-FFF2-40B4-BE49-F238E27FC236}">
+                <a16:creationId xmlns:a16="http://schemas.microsoft.com/office/drawing/2014/main" id="{CE0D37D3-6157-4062-9137-5816F4FE2658}"/>
+              </a:ext>
+            </a:extLst>
+          </p:cNvPr>
+          <p:cNvPicPr>
+            <a:picLocks noChangeAspect="1"/>
+          </p:cNvPicPr>
+          <p:nvPr/>
+        </p:nvPicPr>
+        <p:blipFill>
+          <a:blip r:embed="rId2"/>
+          <a:stretch>
+            <a:fillRect/>
+          </a:stretch>
+        </p:blipFill>
+        <p:spPr>
+          <a:xfrm>
+            <a:off x="582987" y="1704976"/>
+            <a:ext cx="4531670" cy="2483783"/>
+          </a:xfrm>
+          <a:prstGeom prst="rect">
+            <a:avLst/>
+          </a:prstGeom>
+        </p:spPr>
+      </p:pic>
+    </p:spTree>
+    <p:extLst>
+      <p:ext uri="{BB962C8B-B14F-4D97-AF65-F5344CB8AC3E}">
+        <p14:creationId xmlns:p14="http://schemas.microsoft.com/office/powerpoint/2010/main" val="534994514"/>
+      </p:ext>
+    </p:extLst>
+  </p:cSld>
+  <p:clrMapOvr>
+    <a:masterClrMapping/>
+  </p:clrMapOvr>
+</p:sld>
+</file>
+
+<file path=ppt/slides/slide6.xml><?xml version="1.0" encoding="utf-8"?>
+<p:sld xmlns:a="http://schemas.openxmlformats.org/drawingml/2006/main" xmlns:r="http://schemas.openxmlformats.org/officeDocument/2006/relationships" xmlns:p="http://schemas.openxmlformats.org/presentationml/2006/main">
+  <p:cSld>
+    <p:spTree>
+      <p:nvGrpSpPr>
         <p:cNvPr id="1" name="Shape 289"/>
         <p:cNvGrpSpPr/>
         <p:nvPr/>
@@ -16203,7 +16314,7 @@
 </p:sld>
 </file>
 
-<file path=ppt/slides/slide6.xml><?xml version="1.0" encoding="utf-8"?>
+<file path=ppt/slides/slide7.xml><?xml version="1.0" encoding="utf-8"?>
 <p:sld xmlns:a="http://schemas.openxmlformats.org/drawingml/2006/main" xmlns:r="http://schemas.openxmlformats.org/officeDocument/2006/relationships" xmlns:p="http://schemas.openxmlformats.org/presentationml/2006/main">
   <p:cSld>
     <p:spTree>
@@ -16420,367 +16531,7 @@
 </p:sld>
 </file>
 
-<file path=ppt/slides/slide7.xml><?xml version="1.0" encoding="utf-8"?>
-<p:sld xmlns:a="http://schemas.openxmlformats.org/drawingml/2006/main" xmlns:r="http://schemas.openxmlformats.org/officeDocument/2006/relationships" xmlns:p="http://schemas.openxmlformats.org/presentationml/2006/main">
-  <p:cSld>
-    <p:spTree>
-      <p:nvGrpSpPr>
-        <p:cNvPr id="1" name="Shape 305"/>
-        <p:cNvGrpSpPr/>
-        <p:nvPr/>
-      </p:nvGrpSpPr>
-      <p:grpSpPr>
-        <a:xfrm>
-          <a:off x="0" y="0"/>
-          <a:ext cx="0" cy="0"/>
-          <a:chOff x="0" y="0"/>
-          <a:chExt cx="0" cy="0"/>
-        </a:xfrm>
-      </p:grpSpPr>
-      <p:sp>
-        <p:nvSpPr>
-          <p:cNvPr id="306" name="Google Shape;306;p17"/>
-          <p:cNvSpPr txBox="1">
-            <a:spLocks noGrp="1"/>
-          </p:cNvSpPr>
-          <p:nvPr>
-            <p:ph type="title"/>
-          </p:nvPr>
-        </p:nvSpPr>
-        <p:spPr>
-          <a:xfrm>
-            <a:off x="1255825" y="566175"/>
-            <a:ext cx="7030500" cy="999300"/>
-          </a:xfrm>
-          <a:prstGeom prst="rect">
-            <a:avLst/>
-          </a:prstGeom>
-        </p:spPr>
-        <p:txBody>
-          <a:bodyPr spcFirstLastPara="1" wrap="square" lIns="91425" tIns="91425" rIns="91425" bIns="91425" anchor="t" anchorCtr="0">
-            <a:noAutofit/>
-          </a:bodyPr>
-          <a:lstStyle/>
-          <a:p>
-            <a:pPr marL="0" lvl="0" indent="0" algn="l" rtl="0">
-              <a:spcBef>
-                <a:spcPts val="0"/>
-              </a:spcBef>
-              <a:spcAft>
-                <a:spcPts val="0"/>
-              </a:spcAft>
-              <a:buNone/>
-            </a:pPr>
-            <a:r>
-              <a:rPr lang="en" dirty="0"/>
-              <a:t>TARGET based Correlation</a:t>
-            </a:r>
-            <a:endParaRPr dirty="0"/>
-          </a:p>
-        </p:txBody>
-      </p:sp>
-      <p:pic>
-        <p:nvPicPr>
-          <p:cNvPr id="307" name="Google Shape;307;p17"/>
-          <p:cNvPicPr preferRelativeResize="0"/>
-          <p:nvPr/>
-        </p:nvPicPr>
-        <p:blipFill>
-          <a:blip r:embed="rId3">
-            <a:alphaModFix/>
-          </a:blip>
-          <a:stretch>
-            <a:fillRect/>
-          </a:stretch>
-        </p:blipFill>
-        <p:spPr>
-          <a:xfrm>
-            <a:off x="826876" y="1231822"/>
-            <a:ext cx="4031949" cy="3576899"/>
-          </a:xfrm>
-          <a:prstGeom prst="rect">
-            <a:avLst/>
-          </a:prstGeom>
-          <a:noFill/>
-          <a:ln>
-            <a:noFill/>
-          </a:ln>
-        </p:spPr>
-      </p:pic>
-      <p:pic>
-        <p:nvPicPr>
-          <p:cNvPr id="308" name="Google Shape;308;p17"/>
-          <p:cNvPicPr preferRelativeResize="0"/>
-          <p:nvPr/>
-        </p:nvPicPr>
-        <p:blipFill>
-          <a:blip r:embed="rId4">
-            <a:alphaModFix/>
-          </a:blip>
-          <a:stretch>
-            <a:fillRect/>
-          </a:stretch>
-        </p:blipFill>
-        <p:spPr>
-          <a:xfrm>
-            <a:off x="4932725" y="1237500"/>
-            <a:ext cx="3973650" cy="3525197"/>
-          </a:xfrm>
-          <a:prstGeom prst="rect">
-            <a:avLst/>
-          </a:prstGeom>
-          <a:noFill/>
-          <a:ln>
-            <a:noFill/>
-          </a:ln>
-        </p:spPr>
-      </p:pic>
-      <p:sp>
-        <p:nvSpPr>
-          <p:cNvPr id="309" name="Google Shape;309;p17"/>
-          <p:cNvSpPr txBox="1"/>
-          <p:nvPr/>
-        </p:nvSpPr>
-        <p:spPr>
-          <a:xfrm>
-            <a:off x="1606923" y="4697678"/>
-            <a:ext cx="2749923" cy="334800"/>
-          </a:xfrm>
-          <a:prstGeom prst="rect">
-            <a:avLst/>
-          </a:prstGeom>
-          <a:noFill/>
-          <a:ln>
-            <a:noFill/>
-          </a:ln>
-        </p:spPr>
-        <p:txBody>
-          <a:bodyPr spcFirstLastPara="1" wrap="square" lIns="91425" tIns="91425" rIns="91425" bIns="91425" anchor="t" anchorCtr="0">
-            <a:noAutofit/>
-          </a:bodyPr>
-          <a:lstStyle/>
-          <a:p>
-            <a:pPr marL="0" lvl="0" indent="0" algn="l" rtl="0">
-              <a:spcBef>
-                <a:spcPts val="0"/>
-              </a:spcBef>
-              <a:spcAft>
-                <a:spcPts val="0"/>
-              </a:spcAft>
-              <a:buNone/>
-            </a:pPr>
-            <a:r>
-              <a:rPr lang="en-US" sz="1100" dirty="0">
-                <a:latin typeface="Nunito"/>
-                <a:ea typeface="Nunito"/>
-                <a:cs typeface="Nunito"/>
-                <a:sym typeface="Nunito"/>
-              </a:rPr>
-              <a:t>People with NO payment difficulties</a:t>
-            </a:r>
-            <a:endParaRPr sz="1100" dirty="0">
-              <a:latin typeface="Nunito"/>
-              <a:ea typeface="Nunito"/>
-              <a:cs typeface="Nunito"/>
-              <a:sym typeface="Nunito"/>
-            </a:endParaRPr>
-          </a:p>
-        </p:txBody>
-      </p:sp>
-      <p:sp>
-        <p:nvSpPr>
-          <p:cNvPr id="310" name="Google Shape;310;p17"/>
-          <p:cNvSpPr txBox="1"/>
-          <p:nvPr/>
-        </p:nvSpPr>
-        <p:spPr>
-          <a:xfrm>
-            <a:off x="6192371" y="4764225"/>
-            <a:ext cx="2366681" cy="334800"/>
-          </a:xfrm>
-          <a:prstGeom prst="rect">
-            <a:avLst/>
-          </a:prstGeom>
-          <a:noFill/>
-          <a:ln>
-            <a:noFill/>
-          </a:ln>
-        </p:spPr>
-        <p:txBody>
-          <a:bodyPr spcFirstLastPara="1" wrap="square" lIns="91425" tIns="91425" rIns="91425" bIns="91425" anchor="t" anchorCtr="0">
-            <a:noAutofit/>
-          </a:bodyPr>
-          <a:lstStyle/>
-          <a:p>
-            <a:pPr marL="0" lvl="0" indent="0" algn="l" rtl="0">
-              <a:spcBef>
-                <a:spcPts val="0"/>
-              </a:spcBef>
-              <a:spcAft>
-                <a:spcPts val="0"/>
-              </a:spcAft>
-              <a:buNone/>
-            </a:pPr>
-            <a:r>
-              <a:rPr lang="en-US" sz="1100" dirty="0">
-                <a:latin typeface="Nunito"/>
-                <a:ea typeface="Nunito"/>
-                <a:cs typeface="Nunito"/>
-                <a:sym typeface="Nunito"/>
-              </a:rPr>
-              <a:t>People with payment difficulties</a:t>
-            </a:r>
-            <a:endParaRPr sz="1100" dirty="0">
-              <a:latin typeface="Nunito"/>
-              <a:ea typeface="Nunito"/>
-              <a:cs typeface="Nunito"/>
-              <a:sym typeface="Nunito"/>
-            </a:endParaRPr>
-          </a:p>
-        </p:txBody>
-      </p:sp>
-    </p:spTree>
-  </p:cSld>
-  <p:clrMapOvr>
-    <a:masterClrMapping/>
-  </p:clrMapOvr>
-</p:sld>
-</file>
-
 <file path=ppt/slides/slide8.xml><?xml version="1.0" encoding="utf-8"?>
-<p:sld xmlns:a="http://schemas.openxmlformats.org/drawingml/2006/main" xmlns:r="http://schemas.openxmlformats.org/officeDocument/2006/relationships" xmlns:p="http://schemas.openxmlformats.org/presentationml/2006/main">
-  <p:cSld>
-    <p:spTree>
-      <p:nvGrpSpPr>
-        <p:cNvPr id="1" name="Shape 314"/>
-        <p:cNvGrpSpPr/>
-        <p:nvPr/>
-      </p:nvGrpSpPr>
-      <p:grpSpPr>
-        <a:xfrm>
-          <a:off x="0" y="0"/>
-          <a:ext cx="0" cy="0"/>
-          <a:chOff x="0" y="0"/>
-          <a:chExt cx="0" cy="0"/>
-        </a:xfrm>
-      </p:grpSpPr>
-      <p:sp>
-        <p:nvSpPr>
-          <p:cNvPr id="315" name="Google Shape;315;p18"/>
-          <p:cNvSpPr txBox="1">
-            <a:spLocks noGrp="1"/>
-          </p:cNvSpPr>
-          <p:nvPr>
-            <p:ph type="title"/>
-          </p:nvPr>
-        </p:nvSpPr>
-        <p:spPr>
-          <a:xfrm>
-            <a:off x="1303800" y="598575"/>
-            <a:ext cx="7030500" cy="999300"/>
-          </a:xfrm>
-          <a:prstGeom prst="rect">
-            <a:avLst/>
-          </a:prstGeom>
-        </p:spPr>
-        <p:txBody>
-          <a:bodyPr spcFirstLastPara="1" wrap="square" lIns="91425" tIns="91425" rIns="91425" bIns="91425" anchor="t" anchorCtr="0">
-            <a:noAutofit/>
-          </a:bodyPr>
-          <a:lstStyle/>
-          <a:p>
-            <a:pPr marL="0" lvl="0" indent="0" algn="l" rtl="0">
-              <a:spcBef>
-                <a:spcPts val="0"/>
-              </a:spcBef>
-              <a:spcAft>
-                <a:spcPts val="0"/>
-              </a:spcAft>
-              <a:buNone/>
-            </a:pPr>
-            <a:r>
-              <a:rPr lang="en"/>
-              <a:t>...contd Correlation</a:t>
-            </a:r>
-            <a:endParaRPr/>
-          </a:p>
-        </p:txBody>
-      </p:sp>
-      <p:sp>
-        <p:nvSpPr>
-          <p:cNvPr id="316" name="Google Shape;316;p18"/>
-          <p:cNvSpPr txBox="1">
-            <a:spLocks noGrp="1"/>
-          </p:cNvSpPr>
-          <p:nvPr>
-            <p:ph type="body" idx="1"/>
-          </p:nvPr>
-        </p:nvSpPr>
-        <p:spPr>
-          <a:xfrm>
-            <a:off x="873494" y="1597875"/>
-            <a:ext cx="7030500" cy="2541600"/>
-          </a:xfrm>
-          <a:prstGeom prst="rect">
-            <a:avLst/>
-          </a:prstGeom>
-        </p:spPr>
-        <p:txBody>
-          <a:bodyPr spcFirstLastPara="1" wrap="square" lIns="91425" tIns="91425" rIns="91425" bIns="91425" anchor="t" anchorCtr="0">
-            <a:noAutofit/>
-          </a:bodyPr>
-          <a:lstStyle/>
-          <a:p>
-            <a:pPr marL="457200" lvl="0" indent="-311150" algn="l" rtl="0">
-              <a:lnSpc>
-                <a:spcPct val="200000"/>
-              </a:lnSpc>
-              <a:spcBef>
-                <a:spcPts val="0"/>
-              </a:spcBef>
-              <a:spcAft>
-                <a:spcPts val="0"/>
-              </a:spcAft>
-              <a:buSzPts val="1300"/>
-              <a:buChar char="●"/>
-            </a:pPr>
-            <a:r>
-              <a:rPr lang="en" dirty="0"/>
-              <a:t>AMT_CREDIT And AMT_ANNUITY have the highest correlation in both the data sets</a:t>
-            </a:r>
-            <a:endParaRPr dirty="0"/>
-          </a:p>
-          <a:p>
-            <a:pPr marL="457200" lvl="0" indent="-311150" algn="l" rtl="0">
-              <a:lnSpc>
-                <a:spcPct val="200000"/>
-              </a:lnSpc>
-              <a:spcBef>
-                <a:spcPts val="0"/>
-              </a:spcBef>
-              <a:spcAft>
-                <a:spcPts val="0"/>
-              </a:spcAft>
-              <a:buSzPts val="1300"/>
-              <a:buChar char="●"/>
-            </a:pPr>
-            <a:r>
-              <a:rPr lang="en" dirty="0"/>
-              <a:t>These are even more correlated for target 0 i.e for the cases where there is not default</a:t>
-            </a:r>
-            <a:endParaRPr dirty="0"/>
-          </a:p>
-        </p:txBody>
-      </p:sp>
-    </p:spTree>
-  </p:cSld>
-  <p:clrMapOvr>
-    <a:masterClrMapping/>
-  </p:clrMapOvr>
-</p:sld>
-</file>
-
-<file path=ppt/slides/slide9.xml><?xml version="1.0" encoding="utf-8"?>
 <p:sld xmlns:a="http://schemas.openxmlformats.org/drawingml/2006/main" xmlns:r="http://schemas.openxmlformats.org/officeDocument/2006/relationships" xmlns:p="http://schemas.openxmlformats.org/presentationml/2006/main">
   <p:cSld>
     <p:spTree>
@@ -16875,34 +16626,6 @@
           </a:ln>
         </p:spPr>
       </p:pic>
-      <p:pic>
-        <p:nvPicPr>
-          <p:cNvPr id="323" name="Google Shape;323;p19"/>
-          <p:cNvPicPr preferRelativeResize="0"/>
-          <p:nvPr/>
-        </p:nvPicPr>
-        <p:blipFill>
-          <a:blip r:embed="rId4">
-            <a:alphaModFix/>
-          </a:blip>
-          <a:stretch>
-            <a:fillRect/>
-          </a:stretch>
-        </p:blipFill>
-        <p:spPr>
-          <a:xfrm>
-            <a:off x="5032415" y="1146850"/>
-            <a:ext cx="3547290" cy="3691850"/>
-          </a:xfrm>
-          <a:prstGeom prst="rect">
-            <a:avLst/>
-          </a:prstGeom>
-          <a:noFill/>
-          <a:ln>
-            <a:noFill/>
-          </a:ln>
-        </p:spPr>
-      </p:pic>
       <p:sp>
         <p:nvSpPr>
           <p:cNvPr id="7" name="Google Shape;309;p17">
@@ -16963,10 +16686,230 @@
       </p:sp>
       <p:sp>
         <p:nvSpPr>
-          <p:cNvPr id="8" name="Google Shape;310;p17">
+          <p:cNvPr id="2" name="Rectangle 1">
             <a:extLst>
               <a:ext uri="{FF2B5EF4-FFF2-40B4-BE49-F238E27FC236}">
-                <a16:creationId xmlns:a16="http://schemas.microsoft.com/office/drawing/2014/main" id="{425946D3-7491-4BB8-BCA9-7B8B9015E4E8}"/>
+                <a16:creationId xmlns:a16="http://schemas.microsoft.com/office/drawing/2014/main" id="{181E3C35-D48A-46F6-B5E6-36EDDF8FC008}"/>
+              </a:ext>
+            </a:extLst>
+          </p:cNvPr>
+          <p:cNvSpPr/>
+          <p:nvPr/>
+        </p:nvSpPr>
+        <p:spPr>
+          <a:xfrm>
+            <a:off x="5217459" y="1260688"/>
+            <a:ext cx="3684494" cy="2479333"/>
+          </a:xfrm>
+          <a:prstGeom prst="rect">
+            <a:avLst/>
+          </a:prstGeom>
+        </p:spPr>
+        <p:txBody>
+          <a:bodyPr wrap="square">
+            <a:spAutoFit/>
+          </a:bodyPr>
+          <a:lstStyle/>
+          <a:p>
+            <a:pPr marL="457200" lvl="0" indent="-311150" algn="just">
+              <a:lnSpc>
+                <a:spcPct val="150000"/>
+              </a:lnSpc>
+              <a:spcBef>
+                <a:spcPts val="1600"/>
+              </a:spcBef>
+              <a:buSzPts val="1300"/>
+              <a:buChar char="●"/>
+            </a:pPr>
+            <a:r>
+              <a:rPr lang="en-US" sz="1200" dirty="0"/>
+              <a:t>Majority of on time paying clients lies in higher range of AMT_INCOME_TOTAL</a:t>
+            </a:r>
+          </a:p>
+          <a:p>
+            <a:pPr marL="146050" lvl="0" algn="just">
+              <a:lnSpc>
+                <a:spcPct val="150000"/>
+              </a:lnSpc>
+              <a:spcBef>
+                <a:spcPts val="1600"/>
+              </a:spcBef>
+              <a:buSzPts val="1300"/>
+            </a:pPr>
+            <a:endParaRPr lang="en-US" sz="1200" dirty="0"/>
+          </a:p>
+          <a:p>
+            <a:pPr marL="457200" lvl="0" indent="-311150" algn="just">
+              <a:lnSpc>
+                <a:spcPct val="150000"/>
+              </a:lnSpc>
+              <a:buSzPts val="1300"/>
+              <a:buChar char="●"/>
+            </a:pPr>
+            <a:r>
+              <a:rPr lang="en-US" sz="1200" dirty="0"/>
+              <a:t>Clients with lower secondary who opted for large sum of loan (945000.0) have paid on time while clients of same education who took loans of moderate size (450000.0) have defaulted.</a:t>
+            </a:r>
+          </a:p>
+        </p:txBody>
+      </p:sp>
+    </p:spTree>
+  </p:cSld>
+  <p:clrMapOvr>
+    <a:masterClrMapping/>
+  </p:clrMapOvr>
+</p:sld>
+</file>
+
+<file path=ppt/slides/slide9.xml><?xml version="1.0" encoding="utf-8"?>
+<p:sld xmlns:a="http://schemas.openxmlformats.org/drawingml/2006/main" xmlns:r="http://schemas.openxmlformats.org/officeDocument/2006/relationships" xmlns:p="http://schemas.openxmlformats.org/presentationml/2006/main">
+  <p:cSld>
+    <p:spTree>
+      <p:nvGrpSpPr>
+        <p:cNvPr id="1" name="Shape 329"/>
+        <p:cNvGrpSpPr/>
+        <p:nvPr/>
+      </p:nvGrpSpPr>
+      <p:grpSpPr>
+        <a:xfrm>
+          <a:off x="0" y="0"/>
+          <a:ext cx="0" cy="0"/>
+          <a:chOff x="0" y="0"/>
+          <a:chExt cx="0" cy="0"/>
+        </a:xfrm>
+      </p:grpSpPr>
+      <p:sp>
+        <p:nvSpPr>
+          <p:cNvPr id="331" name="Google Shape;331;p20"/>
+          <p:cNvSpPr txBox="1">
+            <a:spLocks noGrp="1"/>
+          </p:cNvSpPr>
+          <p:nvPr>
+            <p:ph type="body" idx="1"/>
+          </p:nvPr>
+        </p:nvSpPr>
+        <p:spPr>
+          <a:xfrm>
+            <a:off x="981975" y="853075"/>
+            <a:ext cx="3329377" cy="4054700"/>
+          </a:xfrm>
+          <a:prstGeom prst="rect">
+            <a:avLst/>
+          </a:prstGeom>
+        </p:spPr>
+        <p:txBody>
+          <a:bodyPr spcFirstLastPara="1" wrap="square" lIns="91425" tIns="91425" rIns="91425" bIns="91425" anchor="t" anchorCtr="0">
+            <a:noAutofit/>
+          </a:bodyPr>
+          <a:lstStyle/>
+          <a:p>
+            <a:pPr marL="0" lvl="0" indent="0" algn="just" rtl="0">
+              <a:spcBef>
+                <a:spcPts val="0"/>
+              </a:spcBef>
+              <a:spcAft>
+                <a:spcPts val="0"/>
+              </a:spcAft>
+              <a:buNone/>
+            </a:pPr>
+            <a:r>
+              <a:rPr lang="en" dirty="0"/>
+              <a:t>For  clients </a:t>
+            </a:r>
+            <a:r>
+              <a:rPr lang="en-US" dirty="0"/>
+              <a:t>with payment difficulties</a:t>
+            </a:r>
+            <a:endParaRPr dirty="0"/>
+          </a:p>
+          <a:p>
+            <a:pPr marL="457200" lvl="0" indent="-311150" algn="just" rtl="0">
+              <a:spcBef>
+                <a:spcPts val="1600"/>
+              </a:spcBef>
+              <a:spcAft>
+                <a:spcPts val="0"/>
+              </a:spcAft>
+              <a:buSzPts val="1300"/>
+              <a:buChar char="●"/>
+            </a:pPr>
+            <a:r>
+              <a:rPr lang="en-US" dirty="0"/>
+              <a:t>Although academic degree seems to be in higher range, there are only 3 cases of default for clients with academic degree and those are in middle income range. </a:t>
+            </a:r>
+          </a:p>
+          <a:p>
+            <a:pPr marL="457200" lvl="0" indent="-311150" algn="just" rtl="0">
+              <a:spcBef>
+                <a:spcPts val="1600"/>
+              </a:spcBef>
+              <a:spcAft>
+                <a:spcPts val="0"/>
+              </a:spcAft>
+              <a:buSzPts val="1300"/>
+              <a:buChar char="●"/>
+            </a:pPr>
+            <a:endParaRPr lang="en-US" dirty="0"/>
+          </a:p>
+          <a:p>
+            <a:pPr marL="457200" lvl="0" indent="-311150" algn="just" rtl="0">
+              <a:spcBef>
+                <a:spcPts val="0"/>
+              </a:spcBef>
+              <a:spcAft>
+                <a:spcPts val="0"/>
+              </a:spcAft>
+              <a:buSzPts val="1300"/>
+              <a:buChar char="●"/>
+            </a:pPr>
+            <a:r>
+              <a:rPr lang="en-US" dirty="0"/>
+              <a:t>Clients with lower secondary education level are more likely to default for Total Income&lt; 400000</a:t>
+            </a:r>
+            <a:endParaRPr dirty="0"/>
+          </a:p>
+        </p:txBody>
+      </p:sp>
+      <p:pic>
+        <p:nvPicPr>
+          <p:cNvPr id="4" name="Google Shape;323;p19">
+            <a:extLst>
+              <a:ext uri="{FF2B5EF4-FFF2-40B4-BE49-F238E27FC236}">
+                <a16:creationId xmlns:a16="http://schemas.microsoft.com/office/drawing/2014/main" id="{74925407-0D55-4FAE-A4A9-4B65662D7A44}"/>
+              </a:ext>
+            </a:extLst>
+          </p:cNvPr>
+          <p:cNvPicPr preferRelativeResize="0"/>
+          <p:nvPr/>
+        </p:nvPicPr>
+        <p:blipFill>
+          <a:blip r:embed="rId3">
+            <a:alphaModFix/>
+          </a:blip>
+          <a:stretch>
+            <a:fillRect/>
+          </a:stretch>
+        </p:blipFill>
+        <p:spPr>
+          <a:xfrm>
+            <a:off x="4614734" y="853075"/>
+            <a:ext cx="3547290" cy="3691850"/>
+          </a:xfrm>
+          <a:prstGeom prst="rect">
+            <a:avLst/>
+          </a:prstGeom>
+          <a:noFill/>
+          <a:ln>
+            <a:noFill/>
+          </a:ln>
+        </p:spPr>
+      </p:pic>
+      <p:sp>
+        <p:nvSpPr>
+          <p:cNvPr id="5" name="Google Shape;310;p17">
+            <a:extLst>
+              <a:ext uri="{FF2B5EF4-FFF2-40B4-BE49-F238E27FC236}">
+                <a16:creationId xmlns:a16="http://schemas.microsoft.com/office/drawing/2014/main" id="{483FBF7B-8830-4AC8-8A75-9357479FAA31}"/>
               </a:ext>
             </a:extLst>
           </p:cNvPr>
@@ -16975,7 +16918,7 @@
         </p:nvSpPr>
         <p:spPr>
           <a:xfrm>
-            <a:off x="5688106" y="4808700"/>
+            <a:off x="5573806" y="4544925"/>
             <a:ext cx="2891599" cy="334800"/>
           </a:xfrm>
           <a:prstGeom prst="rect">

</xml_diff>